<commit_message>
Change font sizes for Aspuru-Guzik figure
</commit_message>
<xml_diff>
--- a/Figures/k2_and_k3_partitions.pptx
+++ b/Figures/k2_and_k3_partitions.pptx
@@ -4737,8 +4737,8 @@
         </p:nvSpPr>
         <p:spPr>
           <a:xfrm>
-            <a:off x="1620023" y="991006"/>
-            <a:ext cx="2799164" cy="646331"/>
+            <a:off x="1761087" y="1027582"/>
+            <a:ext cx="2517036" cy="553998"/>
           </a:xfrm>
           <a:prstGeom prst="rect">
             <a:avLst/>
@@ -4751,9 +4751,10 @@
           </a:bodyPr>
           <a:lstStyle/>
           <a:p>
-            <a:r>
-              <a:rPr lang="en-US" sz="3600" dirty="0"/>
-              <a:t>k = 2 partition</a:t>
+            <a:pPr algn="ctr"/>
+            <a:r>
+              <a:rPr lang="en-US" sz="3000" dirty="0"/>
+              <a:t>k = 2 partitions</a:t>
             </a:r>
           </a:p>
         </p:txBody>
@@ -4772,8 +4773,8 @@
         </p:nvSpPr>
         <p:spPr>
           <a:xfrm>
-            <a:off x="6041149" y="991006"/>
-            <a:ext cx="2799164" cy="646331"/>
+            <a:off x="6182213" y="1027582"/>
+            <a:ext cx="2517036" cy="553998"/>
           </a:xfrm>
           <a:prstGeom prst="rect">
             <a:avLst/>
@@ -4786,9 +4787,10 @@
           </a:bodyPr>
           <a:lstStyle/>
           <a:p>
-            <a:r>
-              <a:rPr lang="en-US" sz="3600" dirty="0"/>
-              <a:t>k = 3 partition</a:t>
+            <a:pPr algn="ctr"/>
+            <a:r>
+              <a:rPr lang="en-US" sz="3000" dirty="0"/>
+              <a:t>k = 3 partitions</a:t>
             </a:r>
           </a:p>
         </p:txBody>

</xml_diff>